<commit_message>
Se eliminó las plantillas que no se usaran en el background del dashboard
</commit_message>
<xml_diff>
--- a/02_BACKGROUND_DASHBOARD/BACKGROUND.svg.pptx
+++ b/02_BACKGROUND_DASHBOARD/BACKGROUND.svg.pptx
@@ -5,10 +5,7 @@
     <p:sldMasterId id="2147483684" r:id="rId1"/>
   </p:sldMasterIdLst>
   <p:sldIdLst>
-    <p:sldId id="256" r:id="rId2"/>
-    <p:sldId id="257" r:id="rId3"/>
-    <p:sldId id="258" r:id="rId4"/>
-    <p:sldId id="259" r:id="rId5"/>
+    <p:sldId id="259" r:id="rId2"/>
   </p:sldIdLst>
   <p:sldSz cx="10058400" cy="7772400"/>
   <p:notesSz cx="6858000" cy="9144000"/>
@@ -157,7 +154,7 @@
           </a:lstStyle>
           <a:p>
             <a:r>
-              <a:rPr lang="es-ES" smtClean="0"/>
+              <a:rPr lang="es-ES"/>
               <a:t>Haga clic para modificar el estilo de título del patrón</a:t>
             </a:r>
             <a:endParaRPr lang="en-US" dirty="0"/>
@@ -222,7 +219,7 @@
           </a:lstStyle>
           <a:p>
             <a:r>
-              <a:rPr lang="es-ES" smtClean="0"/>
+              <a:rPr lang="es-ES"/>
               <a:t>Haga clic para editar el estilo de subtítulo del patrón</a:t>
             </a:r>
             <a:endParaRPr lang="en-US" dirty="0"/>
@@ -246,7 +243,7 @@
           <a:p>
             <a:fld id="{54E1D8DE-89B9-4A52-8A4D-F21422CFE632}" type="datetimeFigureOut">
               <a:rPr lang="es-BO" smtClean="0"/>
-              <a:t>23/4/2024</a:t>
+              <a:t>27/8/2024</a:t>
             </a:fld>
             <a:endParaRPr lang="es-BO"/>
           </a:p>
@@ -340,7 +337,7 @@
           <a:lstStyle/>
           <a:p>
             <a:r>
-              <a:rPr lang="es-ES" smtClean="0"/>
+              <a:rPr lang="es-ES"/>
               <a:t>Haga clic para modificar el estilo de título del patrón</a:t>
             </a:r>
             <a:endParaRPr lang="en-US" dirty="0"/>
@@ -364,35 +361,35 @@
           <a:p>
             <a:pPr lvl="0"/>
             <a:r>
-              <a:rPr lang="es-ES" smtClean="0"/>
+              <a:rPr lang="es-ES"/>
               <a:t>Editar el estilo de texto del patrón</a:t>
             </a:r>
           </a:p>
           <a:p>
             <a:pPr lvl="1"/>
             <a:r>
-              <a:rPr lang="es-ES" smtClean="0"/>
+              <a:rPr lang="es-ES"/>
               <a:t>Segundo nivel</a:t>
             </a:r>
           </a:p>
           <a:p>
             <a:pPr lvl="2"/>
             <a:r>
-              <a:rPr lang="es-ES" smtClean="0"/>
+              <a:rPr lang="es-ES"/>
               <a:t>Tercer nivel</a:t>
             </a:r>
           </a:p>
           <a:p>
             <a:pPr lvl="3"/>
             <a:r>
-              <a:rPr lang="es-ES" smtClean="0"/>
+              <a:rPr lang="es-ES"/>
               <a:t>Cuarto nivel</a:t>
             </a:r>
           </a:p>
           <a:p>
             <a:pPr lvl="4"/>
             <a:r>
-              <a:rPr lang="es-ES" smtClean="0"/>
+              <a:rPr lang="es-ES"/>
               <a:t>Quinto nivel</a:t>
             </a:r>
             <a:endParaRPr lang="en-US" dirty="0"/>
@@ -416,7 +413,7 @@
           <a:p>
             <a:fld id="{54E1D8DE-89B9-4A52-8A4D-F21422CFE632}" type="datetimeFigureOut">
               <a:rPr lang="es-BO" smtClean="0"/>
-              <a:t>23/4/2024</a:t>
+              <a:t>27/8/2024</a:t>
             </a:fld>
             <a:endParaRPr lang="es-BO"/>
           </a:p>
@@ -515,7 +512,7 @@
           <a:lstStyle/>
           <a:p>
             <a:r>
-              <a:rPr lang="es-ES" smtClean="0"/>
+              <a:rPr lang="es-ES"/>
               <a:t>Haga clic para modificar el estilo de título del patrón</a:t>
             </a:r>
             <a:endParaRPr lang="en-US" dirty="0"/>
@@ -544,35 +541,35 @@
           <a:p>
             <a:pPr lvl="0"/>
             <a:r>
-              <a:rPr lang="es-ES" smtClean="0"/>
+              <a:rPr lang="es-ES"/>
               <a:t>Editar el estilo de texto del patrón</a:t>
             </a:r>
           </a:p>
           <a:p>
             <a:pPr lvl="1"/>
             <a:r>
-              <a:rPr lang="es-ES" smtClean="0"/>
+              <a:rPr lang="es-ES"/>
               <a:t>Segundo nivel</a:t>
             </a:r>
           </a:p>
           <a:p>
             <a:pPr lvl="2"/>
             <a:r>
-              <a:rPr lang="es-ES" smtClean="0"/>
+              <a:rPr lang="es-ES"/>
               <a:t>Tercer nivel</a:t>
             </a:r>
           </a:p>
           <a:p>
             <a:pPr lvl="3"/>
             <a:r>
-              <a:rPr lang="es-ES" smtClean="0"/>
+              <a:rPr lang="es-ES"/>
               <a:t>Cuarto nivel</a:t>
             </a:r>
           </a:p>
           <a:p>
             <a:pPr lvl="4"/>
             <a:r>
-              <a:rPr lang="es-ES" smtClean="0"/>
+              <a:rPr lang="es-ES"/>
               <a:t>Quinto nivel</a:t>
             </a:r>
             <a:endParaRPr lang="en-US" dirty="0"/>
@@ -596,7 +593,7 @@
           <a:p>
             <a:fld id="{54E1D8DE-89B9-4A52-8A4D-F21422CFE632}" type="datetimeFigureOut">
               <a:rPr lang="es-BO" smtClean="0"/>
-              <a:t>23/4/2024</a:t>
+              <a:t>27/8/2024</a:t>
             </a:fld>
             <a:endParaRPr lang="es-BO"/>
           </a:p>
@@ -690,7 +687,7 @@
           <a:lstStyle/>
           <a:p>
             <a:r>
-              <a:rPr lang="es-ES" smtClean="0"/>
+              <a:rPr lang="es-ES"/>
               <a:t>Haga clic para modificar el estilo de título del patrón</a:t>
             </a:r>
             <a:endParaRPr lang="en-US" dirty="0"/>
@@ -714,35 +711,35 @@
           <a:p>
             <a:pPr lvl="0"/>
             <a:r>
-              <a:rPr lang="es-ES" smtClean="0"/>
+              <a:rPr lang="es-ES"/>
               <a:t>Editar el estilo de texto del patrón</a:t>
             </a:r>
           </a:p>
           <a:p>
             <a:pPr lvl="1"/>
             <a:r>
-              <a:rPr lang="es-ES" smtClean="0"/>
+              <a:rPr lang="es-ES"/>
               <a:t>Segundo nivel</a:t>
             </a:r>
           </a:p>
           <a:p>
             <a:pPr lvl="2"/>
             <a:r>
-              <a:rPr lang="es-ES" smtClean="0"/>
+              <a:rPr lang="es-ES"/>
               <a:t>Tercer nivel</a:t>
             </a:r>
           </a:p>
           <a:p>
             <a:pPr lvl="3"/>
             <a:r>
-              <a:rPr lang="es-ES" smtClean="0"/>
+              <a:rPr lang="es-ES"/>
               <a:t>Cuarto nivel</a:t>
             </a:r>
           </a:p>
           <a:p>
             <a:pPr lvl="4"/>
             <a:r>
-              <a:rPr lang="es-ES" smtClean="0"/>
+              <a:rPr lang="es-ES"/>
               <a:t>Quinto nivel</a:t>
             </a:r>
             <a:endParaRPr lang="en-US" dirty="0"/>
@@ -766,7 +763,7 @@
           <a:p>
             <a:fld id="{54E1D8DE-89B9-4A52-8A4D-F21422CFE632}" type="datetimeFigureOut">
               <a:rPr lang="es-BO" smtClean="0"/>
-              <a:t>23/4/2024</a:t>
+              <a:t>27/8/2024</a:t>
             </a:fld>
             <a:endParaRPr lang="es-BO"/>
           </a:p>
@@ -869,7 +866,7 @@
           </a:lstStyle>
           <a:p>
             <a:r>
-              <a:rPr lang="es-ES" smtClean="0"/>
+              <a:rPr lang="es-ES"/>
               <a:t>Haga clic para modificar el estilo de título del patrón</a:t>
             </a:r>
             <a:endParaRPr lang="en-US" dirty="0"/>
@@ -987,7 +984,7 @@
           <a:p>
             <a:pPr lvl="0"/>
             <a:r>
-              <a:rPr lang="es-ES" smtClean="0"/>
+              <a:rPr lang="es-ES"/>
               <a:t>Editar el estilo de texto del patrón</a:t>
             </a:r>
           </a:p>
@@ -1010,7 +1007,7 @@
           <a:p>
             <a:fld id="{54E1D8DE-89B9-4A52-8A4D-F21422CFE632}" type="datetimeFigureOut">
               <a:rPr lang="es-BO" smtClean="0"/>
-              <a:t>23/4/2024</a:t>
+              <a:t>27/8/2024</a:t>
             </a:fld>
             <a:endParaRPr lang="es-BO"/>
           </a:p>
@@ -1104,7 +1101,7 @@
           <a:lstStyle/>
           <a:p>
             <a:r>
-              <a:rPr lang="es-ES" smtClean="0"/>
+              <a:rPr lang="es-ES"/>
               <a:t>Haga clic para modificar el estilo de título del patrón</a:t>
             </a:r>
             <a:endParaRPr lang="en-US" dirty="0"/>
@@ -1133,35 +1130,35 @@
           <a:p>
             <a:pPr lvl="0"/>
             <a:r>
-              <a:rPr lang="es-ES" smtClean="0"/>
+              <a:rPr lang="es-ES"/>
               <a:t>Editar el estilo de texto del patrón</a:t>
             </a:r>
           </a:p>
           <a:p>
             <a:pPr lvl="1"/>
             <a:r>
-              <a:rPr lang="es-ES" smtClean="0"/>
+              <a:rPr lang="es-ES"/>
               <a:t>Segundo nivel</a:t>
             </a:r>
           </a:p>
           <a:p>
             <a:pPr lvl="2"/>
             <a:r>
-              <a:rPr lang="es-ES" smtClean="0"/>
+              <a:rPr lang="es-ES"/>
               <a:t>Tercer nivel</a:t>
             </a:r>
           </a:p>
           <a:p>
             <a:pPr lvl="3"/>
             <a:r>
-              <a:rPr lang="es-ES" smtClean="0"/>
+              <a:rPr lang="es-ES"/>
               <a:t>Cuarto nivel</a:t>
             </a:r>
           </a:p>
           <a:p>
             <a:pPr lvl="4"/>
             <a:r>
-              <a:rPr lang="es-ES" smtClean="0"/>
+              <a:rPr lang="es-ES"/>
               <a:t>Quinto nivel</a:t>
             </a:r>
             <a:endParaRPr lang="en-US" dirty="0"/>
@@ -1190,35 +1187,35 @@
           <a:p>
             <a:pPr lvl="0"/>
             <a:r>
-              <a:rPr lang="es-ES" smtClean="0"/>
+              <a:rPr lang="es-ES"/>
               <a:t>Editar el estilo de texto del patrón</a:t>
             </a:r>
           </a:p>
           <a:p>
             <a:pPr lvl="1"/>
             <a:r>
-              <a:rPr lang="es-ES" smtClean="0"/>
+              <a:rPr lang="es-ES"/>
               <a:t>Segundo nivel</a:t>
             </a:r>
           </a:p>
           <a:p>
             <a:pPr lvl="2"/>
             <a:r>
-              <a:rPr lang="es-ES" smtClean="0"/>
+              <a:rPr lang="es-ES"/>
               <a:t>Tercer nivel</a:t>
             </a:r>
           </a:p>
           <a:p>
             <a:pPr lvl="3"/>
             <a:r>
-              <a:rPr lang="es-ES" smtClean="0"/>
+              <a:rPr lang="es-ES"/>
               <a:t>Cuarto nivel</a:t>
             </a:r>
           </a:p>
           <a:p>
             <a:pPr lvl="4"/>
             <a:r>
-              <a:rPr lang="es-ES" smtClean="0"/>
+              <a:rPr lang="es-ES"/>
               <a:t>Quinto nivel</a:t>
             </a:r>
             <a:endParaRPr lang="en-US" dirty="0"/>
@@ -1242,7 +1239,7 @@
           <a:p>
             <a:fld id="{54E1D8DE-89B9-4A52-8A4D-F21422CFE632}" type="datetimeFigureOut">
               <a:rPr lang="es-BO" smtClean="0"/>
-              <a:t>23/4/2024</a:t>
+              <a:t>27/8/2024</a:t>
             </a:fld>
             <a:endParaRPr lang="es-BO"/>
           </a:p>
@@ -1341,7 +1338,7 @@
           <a:lstStyle/>
           <a:p>
             <a:r>
-              <a:rPr lang="es-ES" smtClean="0"/>
+              <a:rPr lang="es-ES"/>
               <a:t>Haga clic para modificar el estilo de título del patrón</a:t>
             </a:r>
             <a:endParaRPr lang="en-US" dirty="0"/>
@@ -1407,7 +1404,7 @@
           <a:p>
             <a:pPr lvl="0"/>
             <a:r>
-              <a:rPr lang="es-ES" smtClean="0"/>
+              <a:rPr lang="es-ES"/>
               <a:t>Editar el estilo de texto del patrón</a:t>
             </a:r>
           </a:p>
@@ -1435,35 +1432,35 @@
           <a:p>
             <a:pPr lvl="0"/>
             <a:r>
-              <a:rPr lang="es-ES" smtClean="0"/>
+              <a:rPr lang="es-ES"/>
               <a:t>Editar el estilo de texto del patrón</a:t>
             </a:r>
           </a:p>
           <a:p>
             <a:pPr lvl="1"/>
             <a:r>
-              <a:rPr lang="es-ES" smtClean="0"/>
+              <a:rPr lang="es-ES"/>
               <a:t>Segundo nivel</a:t>
             </a:r>
           </a:p>
           <a:p>
             <a:pPr lvl="2"/>
             <a:r>
-              <a:rPr lang="es-ES" smtClean="0"/>
+              <a:rPr lang="es-ES"/>
               <a:t>Tercer nivel</a:t>
             </a:r>
           </a:p>
           <a:p>
             <a:pPr lvl="3"/>
             <a:r>
-              <a:rPr lang="es-ES" smtClean="0"/>
+              <a:rPr lang="es-ES"/>
               <a:t>Cuarto nivel</a:t>
             </a:r>
           </a:p>
           <a:p>
             <a:pPr lvl="4"/>
             <a:r>
-              <a:rPr lang="es-ES" smtClean="0"/>
+              <a:rPr lang="es-ES"/>
               <a:t>Quinto nivel</a:t>
             </a:r>
             <a:endParaRPr lang="en-US" dirty="0"/>
@@ -1529,7 +1526,7 @@
           <a:p>
             <a:pPr lvl="0"/>
             <a:r>
-              <a:rPr lang="es-ES" smtClean="0"/>
+              <a:rPr lang="es-ES"/>
               <a:t>Editar el estilo de texto del patrón</a:t>
             </a:r>
           </a:p>
@@ -1557,35 +1554,35 @@
           <a:p>
             <a:pPr lvl="0"/>
             <a:r>
-              <a:rPr lang="es-ES" smtClean="0"/>
+              <a:rPr lang="es-ES"/>
               <a:t>Editar el estilo de texto del patrón</a:t>
             </a:r>
           </a:p>
           <a:p>
             <a:pPr lvl="1"/>
             <a:r>
-              <a:rPr lang="es-ES" smtClean="0"/>
+              <a:rPr lang="es-ES"/>
               <a:t>Segundo nivel</a:t>
             </a:r>
           </a:p>
           <a:p>
             <a:pPr lvl="2"/>
             <a:r>
-              <a:rPr lang="es-ES" smtClean="0"/>
+              <a:rPr lang="es-ES"/>
               <a:t>Tercer nivel</a:t>
             </a:r>
           </a:p>
           <a:p>
             <a:pPr lvl="3"/>
             <a:r>
-              <a:rPr lang="es-ES" smtClean="0"/>
+              <a:rPr lang="es-ES"/>
               <a:t>Cuarto nivel</a:t>
             </a:r>
           </a:p>
           <a:p>
             <a:pPr lvl="4"/>
             <a:r>
-              <a:rPr lang="es-ES" smtClean="0"/>
+              <a:rPr lang="es-ES"/>
               <a:t>Quinto nivel</a:t>
             </a:r>
             <a:endParaRPr lang="en-US" dirty="0"/>
@@ -1609,7 +1606,7 @@
           <a:p>
             <a:fld id="{54E1D8DE-89B9-4A52-8A4D-F21422CFE632}" type="datetimeFigureOut">
               <a:rPr lang="es-BO" smtClean="0"/>
-              <a:t>23/4/2024</a:t>
+              <a:t>27/8/2024</a:t>
             </a:fld>
             <a:endParaRPr lang="es-BO"/>
           </a:p>
@@ -1703,7 +1700,7 @@
           <a:lstStyle/>
           <a:p>
             <a:r>
-              <a:rPr lang="es-ES" smtClean="0"/>
+              <a:rPr lang="es-ES"/>
               <a:t>Haga clic para modificar el estilo de título del patrón</a:t>
             </a:r>
             <a:endParaRPr lang="en-US" dirty="0"/>
@@ -1727,7 +1724,7 @@
           <a:p>
             <a:fld id="{54E1D8DE-89B9-4A52-8A4D-F21422CFE632}" type="datetimeFigureOut">
               <a:rPr lang="es-BO" smtClean="0"/>
-              <a:t>23/4/2024</a:t>
+              <a:t>27/8/2024</a:t>
             </a:fld>
             <a:endParaRPr lang="es-BO"/>
           </a:p>
@@ -1822,7 +1819,7 @@
           <a:p>
             <a:fld id="{54E1D8DE-89B9-4A52-8A4D-F21422CFE632}" type="datetimeFigureOut">
               <a:rPr lang="es-BO" smtClean="0"/>
-              <a:t>23/4/2024</a:t>
+              <a:t>27/8/2024</a:t>
             </a:fld>
             <a:endParaRPr lang="es-BO"/>
           </a:p>
@@ -1925,7 +1922,7 @@
           </a:lstStyle>
           <a:p>
             <a:r>
-              <a:rPr lang="es-ES" smtClean="0"/>
+              <a:rPr lang="es-ES"/>
               <a:t>Haga clic para modificar el estilo de título del patrón</a:t>
             </a:r>
             <a:endParaRPr lang="en-US" dirty="0"/>
@@ -1982,35 +1979,35 @@
           <a:p>
             <a:pPr lvl="0"/>
             <a:r>
-              <a:rPr lang="es-ES" smtClean="0"/>
+              <a:rPr lang="es-ES"/>
               <a:t>Editar el estilo de texto del patrón</a:t>
             </a:r>
           </a:p>
           <a:p>
             <a:pPr lvl="1"/>
             <a:r>
-              <a:rPr lang="es-ES" smtClean="0"/>
+              <a:rPr lang="es-ES"/>
               <a:t>Segundo nivel</a:t>
             </a:r>
           </a:p>
           <a:p>
             <a:pPr lvl="2"/>
             <a:r>
-              <a:rPr lang="es-ES" smtClean="0"/>
+              <a:rPr lang="es-ES"/>
               <a:t>Tercer nivel</a:t>
             </a:r>
           </a:p>
           <a:p>
             <a:pPr lvl="3"/>
             <a:r>
-              <a:rPr lang="es-ES" smtClean="0"/>
+              <a:rPr lang="es-ES"/>
               <a:t>Cuarto nivel</a:t>
             </a:r>
           </a:p>
           <a:p>
             <a:pPr lvl="4"/>
             <a:r>
-              <a:rPr lang="es-ES" smtClean="0"/>
+              <a:rPr lang="es-ES"/>
               <a:t>Quinto nivel</a:t>
             </a:r>
             <a:endParaRPr lang="en-US" dirty="0"/>
@@ -2076,7 +2073,7 @@
           <a:p>
             <a:pPr lvl="0"/>
             <a:r>
-              <a:rPr lang="es-ES" smtClean="0"/>
+              <a:rPr lang="es-ES"/>
               <a:t>Editar el estilo de texto del patrón</a:t>
             </a:r>
           </a:p>
@@ -2099,7 +2096,7 @@
           <a:p>
             <a:fld id="{54E1D8DE-89B9-4A52-8A4D-F21422CFE632}" type="datetimeFigureOut">
               <a:rPr lang="es-BO" smtClean="0"/>
-              <a:t>23/4/2024</a:t>
+              <a:t>27/8/2024</a:t>
             </a:fld>
             <a:endParaRPr lang="es-BO"/>
           </a:p>
@@ -2202,7 +2199,7 @@
           </a:lstStyle>
           <a:p>
             <a:r>
-              <a:rPr lang="es-ES" smtClean="0"/>
+              <a:rPr lang="es-ES"/>
               <a:t>Haga clic para modificar el estilo de título del patrón</a:t>
             </a:r>
             <a:endParaRPr lang="en-US" dirty="0"/>
@@ -2267,7 +2264,7 @@
           </a:lstStyle>
           <a:p>
             <a:r>
-              <a:rPr lang="es-ES" smtClean="0"/>
+              <a:rPr lang="es-ES"/>
               <a:t>Haga clic en el icono para agregar una imagen</a:t>
             </a:r>
             <a:endParaRPr lang="en-US" dirty="0"/>
@@ -2333,7 +2330,7 @@
           <a:p>
             <a:pPr lvl="0"/>
             <a:r>
-              <a:rPr lang="es-ES" smtClean="0"/>
+              <a:rPr lang="es-ES"/>
               <a:t>Editar el estilo de texto del patrón</a:t>
             </a:r>
           </a:p>
@@ -2356,7 +2353,7 @@
           <a:p>
             <a:fld id="{54E1D8DE-89B9-4A52-8A4D-F21422CFE632}" type="datetimeFigureOut">
               <a:rPr lang="es-BO" smtClean="0"/>
-              <a:t>23/4/2024</a:t>
+              <a:t>27/8/2024</a:t>
             </a:fld>
             <a:endParaRPr lang="es-BO"/>
           </a:p>
@@ -2465,7 +2462,7 @@
           <a:lstStyle/>
           <a:p>
             <a:r>
-              <a:rPr lang="es-ES" smtClean="0"/>
+              <a:rPr lang="es-ES"/>
               <a:t>Haga clic para modificar el estilo de título del patrón</a:t>
             </a:r>
             <a:endParaRPr lang="en-US" dirty="0"/>
@@ -2499,35 +2496,35 @@
           <a:p>
             <a:pPr lvl="0"/>
             <a:r>
-              <a:rPr lang="es-ES" smtClean="0"/>
+              <a:rPr lang="es-ES"/>
               <a:t>Editar el estilo de texto del patrón</a:t>
             </a:r>
           </a:p>
           <a:p>
             <a:pPr lvl="1"/>
             <a:r>
-              <a:rPr lang="es-ES" smtClean="0"/>
+              <a:rPr lang="es-ES"/>
               <a:t>Segundo nivel</a:t>
             </a:r>
           </a:p>
           <a:p>
             <a:pPr lvl="2"/>
             <a:r>
-              <a:rPr lang="es-ES" smtClean="0"/>
+              <a:rPr lang="es-ES"/>
               <a:t>Tercer nivel</a:t>
             </a:r>
           </a:p>
           <a:p>
             <a:pPr lvl="3"/>
             <a:r>
-              <a:rPr lang="es-ES" smtClean="0"/>
+              <a:rPr lang="es-ES"/>
               <a:t>Cuarto nivel</a:t>
             </a:r>
           </a:p>
           <a:p>
             <a:pPr lvl="4"/>
             <a:r>
-              <a:rPr lang="es-ES" smtClean="0"/>
+              <a:rPr lang="es-ES"/>
               <a:t>Quinto nivel</a:t>
             </a:r>
             <a:endParaRPr lang="en-US" dirty="0"/>
@@ -2569,7 +2566,7 @@
           <a:p>
             <a:fld id="{54E1D8DE-89B9-4A52-8A4D-F21422CFE632}" type="datetimeFigureOut">
               <a:rPr lang="es-BO" smtClean="0"/>
-              <a:t>23/4/2024</a:t>
+              <a:t>27/8/2024</a:t>
             </a:fld>
             <a:endParaRPr lang="es-BO"/>
           </a:p>
@@ -2964,899 +2961,6 @@
       <p:bgPr>
         <a:gradFill flip="none" rotWithShape="1">
           <a:gsLst>
-            <a:gs pos="83000">
-              <a:srgbClr val="5F80BA"/>
-            </a:gs>
-            <a:gs pos="60000">
-              <a:srgbClr val="252B48"/>
-            </a:gs>
-            <a:gs pos="0">
-              <a:srgbClr val="252B48"/>
-            </a:gs>
-            <a:gs pos="100000">
-              <a:schemeClr val="accent5">
-                <a:lumMod val="60000"/>
-                <a:lumOff val="40000"/>
-              </a:schemeClr>
-            </a:gs>
-          </a:gsLst>
-          <a:lin ang="2700000" scaled="1"/>
-          <a:tileRect/>
-        </a:gradFill>
-        <a:effectLst/>
-      </p:bgPr>
-    </p:bg>
-    <p:spTree>
-      <p:nvGrpSpPr>
-        <p:cNvPr id="1" name=""/>
-        <p:cNvGrpSpPr/>
-        <p:nvPr/>
-      </p:nvGrpSpPr>
-      <p:grpSpPr>
-        <a:xfrm>
-          <a:off x="0" y="0"/>
-          <a:ext cx="0" cy="0"/>
-          <a:chOff x="0" y="0"/>
-          <a:chExt cx="0" cy="0"/>
-        </a:xfrm>
-      </p:grpSpPr>
-    </p:spTree>
-    <p:extLst>
-      <p:ext uri="{BB962C8B-B14F-4D97-AF65-F5344CB8AC3E}">
-        <p14:creationId xmlns:p14="http://schemas.microsoft.com/office/powerpoint/2010/main" val="3643173967"/>
-      </p:ext>
-    </p:extLst>
-  </p:cSld>
-  <p:clrMapOvr>
-    <a:masterClrMapping/>
-  </p:clrMapOvr>
-  <p:timing>
-    <p:tnLst>
-      <p:par>
-        <p:cTn id="1" dur="indefinite" restart="never" nodeType="tmRoot"/>
-      </p:par>
-    </p:tnLst>
-  </p:timing>
-</p:sld>
-</file>
-
-<file path=ppt/slides/slide2.xml><?xml version="1.0" encoding="utf-8"?>
-<p:sld xmlns:a="http://schemas.openxmlformats.org/drawingml/2006/main" xmlns:r="http://schemas.openxmlformats.org/officeDocument/2006/relationships" xmlns:p="http://schemas.openxmlformats.org/presentationml/2006/main">
-  <p:cSld>
-    <p:bg>
-      <p:bgPr>
-        <a:gradFill flip="none" rotWithShape="1">
-          <a:gsLst>
-            <a:gs pos="87000">
-              <a:srgbClr val="7F9F80"/>
-            </a:gs>
-            <a:gs pos="52000">
-              <a:srgbClr val="124076"/>
-            </a:gs>
-            <a:gs pos="100000">
-              <a:srgbClr val="F9E897"/>
-            </a:gs>
-          </a:gsLst>
-          <a:lin ang="2700000" scaled="1"/>
-          <a:tileRect/>
-        </a:gradFill>
-        <a:effectLst/>
-      </p:bgPr>
-    </p:bg>
-    <p:spTree>
-      <p:nvGrpSpPr>
-        <p:cNvPr id="1" name=""/>
-        <p:cNvGrpSpPr/>
-        <p:nvPr/>
-      </p:nvGrpSpPr>
-      <p:grpSpPr>
-        <a:xfrm>
-          <a:off x="0" y="0"/>
-          <a:ext cx="0" cy="0"/>
-          <a:chOff x="0" y="0"/>
-          <a:chExt cx="0" cy="0"/>
-        </a:xfrm>
-      </p:grpSpPr>
-    </p:spTree>
-    <p:extLst>
-      <p:ext uri="{BB962C8B-B14F-4D97-AF65-F5344CB8AC3E}">
-        <p14:creationId xmlns:p14="http://schemas.microsoft.com/office/powerpoint/2010/main" val="2719237707"/>
-      </p:ext>
-    </p:extLst>
-  </p:cSld>
-  <p:clrMapOvr>
-    <a:masterClrMapping/>
-  </p:clrMapOvr>
-  <p:timing>
-    <p:tnLst>
-      <p:par>
-        <p:cTn id="1" dur="indefinite" restart="never" nodeType="tmRoot"/>
-      </p:par>
-    </p:tnLst>
-  </p:timing>
-</p:sld>
-</file>
-
-<file path=ppt/slides/slide3.xml><?xml version="1.0" encoding="utf-8"?>
-<p:sld xmlns:a="http://schemas.openxmlformats.org/drawingml/2006/main" xmlns:r="http://schemas.openxmlformats.org/officeDocument/2006/relationships" xmlns:p="http://schemas.openxmlformats.org/presentationml/2006/main">
-  <p:cSld>
-    <p:bg>
-      <p:bgPr>
-        <a:gradFill flip="none" rotWithShape="1">
-          <a:gsLst>
-            <a:gs pos="72000">
-              <a:srgbClr val="445069"/>
-            </a:gs>
-            <a:gs pos="41000">
-              <a:srgbClr val="252B48"/>
-            </a:gs>
-            <a:gs pos="100000">
-              <a:srgbClr val="5B9A8B"/>
-            </a:gs>
-          </a:gsLst>
-          <a:lin ang="2700000" scaled="1"/>
-          <a:tileRect/>
-        </a:gradFill>
-        <a:effectLst/>
-      </p:bgPr>
-    </p:bg>
-    <p:spTree>
-      <p:nvGrpSpPr>
-        <p:cNvPr id="1" name=""/>
-        <p:cNvGrpSpPr/>
-        <p:nvPr/>
-      </p:nvGrpSpPr>
-      <p:grpSpPr>
-        <a:xfrm>
-          <a:off x="0" y="0"/>
-          <a:ext cx="0" cy="0"/>
-          <a:chOff x="0" y="0"/>
-          <a:chExt cx="0" cy="0"/>
-        </a:xfrm>
-      </p:grpSpPr>
-      <p:sp>
-        <p:nvSpPr>
-          <p:cNvPr id="8" name="Rectángulo redondeado 7"/>
-          <p:cNvSpPr/>
-          <p:nvPr/>
-        </p:nvSpPr>
-        <p:spPr>
-          <a:xfrm>
-            <a:off x="758757" y="1210861"/>
-            <a:ext cx="2110903" cy="749030"/>
-          </a:xfrm>
-          <a:prstGeom prst="roundRect">
-            <a:avLst/>
-          </a:prstGeom>
-          <a:gradFill>
-            <a:gsLst>
-              <a:gs pos="84000">
-                <a:srgbClr val="5B9A8B"/>
-              </a:gs>
-              <a:gs pos="62000">
-                <a:srgbClr val="445069"/>
-              </a:gs>
-              <a:gs pos="100000">
-                <a:srgbClr val="F7E987"/>
-              </a:gs>
-            </a:gsLst>
-            <a:lin ang="2700000" scaled="1"/>
-          </a:gradFill>
-          <a:scene3d>
-            <a:camera prst="orthographicFront"/>
-            <a:lightRig rig="threePt" dir="t"/>
-          </a:scene3d>
-          <a:sp3d>
-            <a:bevelT/>
-          </a:sp3d>
-        </p:spPr>
-        <p:style>
-          <a:lnRef idx="2">
-            <a:schemeClr val="accent1">
-              <a:shade val="50000"/>
-            </a:schemeClr>
-          </a:lnRef>
-          <a:fillRef idx="1">
-            <a:schemeClr val="accent1"/>
-          </a:fillRef>
-          <a:effectRef idx="0">
-            <a:schemeClr val="accent1"/>
-          </a:effectRef>
-          <a:fontRef idx="minor">
-            <a:schemeClr val="lt1"/>
-          </a:fontRef>
-        </p:style>
-        <p:txBody>
-          <a:bodyPr rtlCol="0" anchor="ctr"/>
-          <a:lstStyle/>
-          <a:p>
-            <a:pPr algn="ctr"/>
-            <a:endParaRPr lang="es-BO"/>
-          </a:p>
-        </p:txBody>
-      </p:sp>
-      <p:sp>
-        <p:nvSpPr>
-          <p:cNvPr id="10" name="Rectángulo redondeado 9"/>
-          <p:cNvSpPr/>
-          <p:nvPr/>
-        </p:nvSpPr>
-        <p:spPr>
-          <a:xfrm>
-            <a:off x="758756" y="2063654"/>
-            <a:ext cx="2110903" cy="749030"/>
-          </a:xfrm>
-          <a:prstGeom prst="roundRect">
-            <a:avLst/>
-          </a:prstGeom>
-          <a:gradFill>
-            <a:gsLst>
-              <a:gs pos="84000">
-                <a:srgbClr val="5B9A8B"/>
-              </a:gs>
-              <a:gs pos="62000">
-                <a:srgbClr val="445069"/>
-              </a:gs>
-              <a:gs pos="100000">
-                <a:srgbClr val="F7E987"/>
-              </a:gs>
-            </a:gsLst>
-            <a:lin ang="2700000" scaled="1"/>
-          </a:gradFill>
-          <a:scene3d>
-            <a:camera prst="orthographicFront"/>
-            <a:lightRig rig="threePt" dir="t"/>
-          </a:scene3d>
-          <a:sp3d>
-            <a:bevelT/>
-          </a:sp3d>
-        </p:spPr>
-        <p:style>
-          <a:lnRef idx="2">
-            <a:schemeClr val="accent1">
-              <a:shade val="50000"/>
-            </a:schemeClr>
-          </a:lnRef>
-          <a:fillRef idx="1">
-            <a:schemeClr val="accent1"/>
-          </a:fillRef>
-          <a:effectRef idx="0">
-            <a:schemeClr val="accent1"/>
-          </a:effectRef>
-          <a:fontRef idx="minor">
-            <a:schemeClr val="lt1"/>
-          </a:fontRef>
-        </p:style>
-        <p:txBody>
-          <a:bodyPr rtlCol="0" anchor="ctr"/>
-          <a:lstStyle/>
-          <a:p>
-            <a:pPr algn="ctr"/>
-            <a:endParaRPr lang="es-BO"/>
-          </a:p>
-        </p:txBody>
-      </p:sp>
-      <p:sp>
-        <p:nvSpPr>
-          <p:cNvPr id="11" name="Rectángulo redondeado 10"/>
-          <p:cNvSpPr/>
-          <p:nvPr/>
-        </p:nvSpPr>
-        <p:spPr>
-          <a:xfrm>
-            <a:off x="2973420" y="1210861"/>
-            <a:ext cx="2110903" cy="749030"/>
-          </a:xfrm>
-          <a:prstGeom prst="roundRect">
-            <a:avLst/>
-          </a:prstGeom>
-          <a:gradFill>
-            <a:gsLst>
-              <a:gs pos="84000">
-                <a:srgbClr val="5B9A8B"/>
-              </a:gs>
-              <a:gs pos="62000">
-                <a:srgbClr val="445069"/>
-              </a:gs>
-              <a:gs pos="100000">
-                <a:srgbClr val="F7E987"/>
-              </a:gs>
-            </a:gsLst>
-            <a:lin ang="2700000" scaled="1"/>
-          </a:gradFill>
-          <a:scene3d>
-            <a:camera prst="orthographicFront"/>
-            <a:lightRig rig="threePt" dir="t"/>
-          </a:scene3d>
-          <a:sp3d>
-            <a:bevelT/>
-          </a:sp3d>
-        </p:spPr>
-        <p:style>
-          <a:lnRef idx="2">
-            <a:schemeClr val="accent1">
-              <a:shade val="50000"/>
-            </a:schemeClr>
-          </a:lnRef>
-          <a:fillRef idx="1">
-            <a:schemeClr val="accent1"/>
-          </a:fillRef>
-          <a:effectRef idx="0">
-            <a:schemeClr val="accent1"/>
-          </a:effectRef>
-          <a:fontRef idx="minor">
-            <a:schemeClr val="lt1"/>
-          </a:fontRef>
-        </p:style>
-        <p:txBody>
-          <a:bodyPr rtlCol="0" anchor="ctr"/>
-          <a:lstStyle/>
-          <a:p>
-            <a:pPr algn="ctr"/>
-            <a:endParaRPr lang="es-BO"/>
-          </a:p>
-        </p:txBody>
-      </p:sp>
-      <p:sp>
-        <p:nvSpPr>
-          <p:cNvPr id="12" name="Rectángulo redondeado 11"/>
-          <p:cNvSpPr/>
-          <p:nvPr/>
-        </p:nvSpPr>
-        <p:spPr>
-          <a:xfrm>
-            <a:off x="2973419" y="2063654"/>
-            <a:ext cx="2110903" cy="749030"/>
-          </a:xfrm>
-          <a:prstGeom prst="roundRect">
-            <a:avLst/>
-          </a:prstGeom>
-          <a:gradFill>
-            <a:gsLst>
-              <a:gs pos="84000">
-                <a:srgbClr val="5B9A8B"/>
-              </a:gs>
-              <a:gs pos="62000">
-                <a:srgbClr val="445069"/>
-              </a:gs>
-              <a:gs pos="100000">
-                <a:srgbClr val="F7E987"/>
-              </a:gs>
-            </a:gsLst>
-            <a:lin ang="2700000" scaled="1"/>
-          </a:gradFill>
-          <a:scene3d>
-            <a:camera prst="orthographicFront"/>
-            <a:lightRig rig="threePt" dir="t"/>
-          </a:scene3d>
-          <a:sp3d>
-            <a:bevelT/>
-          </a:sp3d>
-        </p:spPr>
-        <p:style>
-          <a:lnRef idx="2">
-            <a:schemeClr val="accent1">
-              <a:shade val="50000"/>
-            </a:schemeClr>
-          </a:lnRef>
-          <a:fillRef idx="1">
-            <a:schemeClr val="accent1"/>
-          </a:fillRef>
-          <a:effectRef idx="0">
-            <a:schemeClr val="accent1"/>
-          </a:effectRef>
-          <a:fontRef idx="minor">
-            <a:schemeClr val="lt1"/>
-          </a:fontRef>
-        </p:style>
-        <p:txBody>
-          <a:bodyPr rtlCol="0" anchor="ctr"/>
-          <a:lstStyle/>
-          <a:p>
-            <a:pPr algn="ctr"/>
-            <a:endParaRPr lang="es-BO"/>
-          </a:p>
-        </p:txBody>
-      </p:sp>
-      <p:sp>
-        <p:nvSpPr>
-          <p:cNvPr id="13" name="Rectángulo redondeado 12"/>
-          <p:cNvSpPr/>
-          <p:nvPr/>
-        </p:nvSpPr>
-        <p:spPr>
-          <a:xfrm>
-            <a:off x="5207539" y="1210861"/>
-            <a:ext cx="2110903" cy="749030"/>
-          </a:xfrm>
-          <a:prstGeom prst="roundRect">
-            <a:avLst/>
-          </a:prstGeom>
-          <a:gradFill>
-            <a:gsLst>
-              <a:gs pos="84000">
-                <a:srgbClr val="5B9A8B"/>
-              </a:gs>
-              <a:gs pos="62000">
-                <a:srgbClr val="445069"/>
-              </a:gs>
-              <a:gs pos="100000">
-                <a:srgbClr val="F7E987"/>
-              </a:gs>
-            </a:gsLst>
-            <a:lin ang="2700000" scaled="1"/>
-          </a:gradFill>
-          <a:scene3d>
-            <a:camera prst="orthographicFront"/>
-            <a:lightRig rig="threePt" dir="t"/>
-          </a:scene3d>
-          <a:sp3d>
-            <a:bevelT/>
-          </a:sp3d>
-        </p:spPr>
-        <p:style>
-          <a:lnRef idx="2">
-            <a:schemeClr val="accent1">
-              <a:shade val="50000"/>
-            </a:schemeClr>
-          </a:lnRef>
-          <a:fillRef idx="1">
-            <a:schemeClr val="accent1"/>
-          </a:fillRef>
-          <a:effectRef idx="0">
-            <a:schemeClr val="accent1"/>
-          </a:effectRef>
-          <a:fontRef idx="minor">
-            <a:schemeClr val="lt1"/>
-          </a:fontRef>
-        </p:style>
-        <p:txBody>
-          <a:bodyPr rtlCol="0" anchor="ctr"/>
-          <a:lstStyle/>
-          <a:p>
-            <a:pPr algn="ctr"/>
-            <a:endParaRPr lang="es-BO"/>
-          </a:p>
-        </p:txBody>
-      </p:sp>
-      <p:sp>
-        <p:nvSpPr>
-          <p:cNvPr id="14" name="Rectángulo redondeado 13"/>
-          <p:cNvSpPr/>
-          <p:nvPr/>
-        </p:nvSpPr>
-        <p:spPr>
-          <a:xfrm>
-            <a:off x="5207538" y="2063654"/>
-            <a:ext cx="2110903" cy="749030"/>
-          </a:xfrm>
-          <a:prstGeom prst="roundRect">
-            <a:avLst/>
-          </a:prstGeom>
-          <a:gradFill>
-            <a:gsLst>
-              <a:gs pos="84000">
-                <a:srgbClr val="5B9A8B"/>
-              </a:gs>
-              <a:gs pos="62000">
-                <a:srgbClr val="445069"/>
-              </a:gs>
-              <a:gs pos="100000">
-                <a:srgbClr val="F7E987"/>
-              </a:gs>
-            </a:gsLst>
-            <a:lin ang="2700000" scaled="1"/>
-          </a:gradFill>
-          <a:scene3d>
-            <a:camera prst="orthographicFront"/>
-            <a:lightRig rig="threePt" dir="t"/>
-          </a:scene3d>
-          <a:sp3d>
-            <a:bevelT/>
-          </a:sp3d>
-        </p:spPr>
-        <p:style>
-          <a:lnRef idx="2">
-            <a:schemeClr val="accent1">
-              <a:shade val="50000"/>
-            </a:schemeClr>
-          </a:lnRef>
-          <a:fillRef idx="1">
-            <a:schemeClr val="accent1"/>
-          </a:fillRef>
-          <a:effectRef idx="0">
-            <a:schemeClr val="accent1"/>
-          </a:effectRef>
-          <a:fontRef idx="minor">
-            <a:schemeClr val="lt1"/>
-          </a:fontRef>
-        </p:style>
-        <p:txBody>
-          <a:bodyPr rtlCol="0" anchor="ctr"/>
-          <a:lstStyle/>
-          <a:p>
-            <a:pPr algn="ctr"/>
-            <a:endParaRPr lang="es-BO"/>
-          </a:p>
-        </p:txBody>
-      </p:sp>
-      <p:sp>
-        <p:nvSpPr>
-          <p:cNvPr id="15" name="Rectángulo redondeado 14"/>
-          <p:cNvSpPr/>
-          <p:nvPr/>
-        </p:nvSpPr>
-        <p:spPr>
-          <a:xfrm>
-            <a:off x="7451383" y="1210861"/>
-            <a:ext cx="2110903" cy="749030"/>
-          </a:xfrm>
-          <a:prstGeom prst="roundRect">
-            <a:avLst/>
-          </a:prstGeom>
-          <a:gradFill>
-            <a:gsLst>
-              <a:gs pos="84000">
-                <a:srgbClr val="5B9A8B"/>
-              </a:gs>
-              <a:gs pos="62000">
-                <a:srgbClr val="445069"/>
-              </a:gs>
-              <a:gs pos="100000">
-                <a:srgbClr val="F7E987"/>
-              </a:gs>
-            </a:gsLst>
-            <a:lin ang="2700000" scaled="1"/>
-          </a:gradFill>
-          <a:scene3d>
-            <a:camera prst="orthographicFront"/>
-            <a:lightRig rig="threePt" dir="t"/>
-          </a:scene3d>
-          <a:sp3d>
-            <a:bevelT/>
-          </a:sp3d>
-        </p:spPr>
-        <p:style>
-          <a:lnRef idx="2">
-            <a:schemeClr val="accent1">
-              <a:shade val="50000"/>
-            </a:schemeClr>
-          </a:lnRef>
-          <a:fillRef idx="1">
-            <a:schemeClr val="accent1"/>
-          </a:fillRef>
-          <a:effectRef idx="0">
-            <a:schemeClr val="accent1"/>
-          </a:effectRef>
-          <a:fontRef idx="minor">
-            <a:schemeClr val="lt1"/>
-          </a:fontRef>
-        </p:style>
-        <p:txBody>
-          <a:bodyPr rtlCol="0" anchor="ctr"/>
-          <a:lstStyle/>
-          <a:p>
-            <a:pPr algn="ctr"/>
-            <a:endParaRPr lang="es-BO"/>
-          </a:p>
-        </p:txBody>
-      </p:sp>
-      <p:sp>
-        <p:nvSpPr>
-          <p:cNvPr id="16" name="Rectángulo redondeado 15"/>
-          <p:cNvSpPr/>
-          <p:nvPr/>
-        </p:nvSpPr>
-        <p:spPr>
-          <a:xfrm>
-            <a:off x="7451382" y="2073382"/>
-            <a:ext cx="2110903" cy="749030"/>
-          </a:xfrm>
-          <a:prstGeom prst="roundRect">
-            <a:avLst/>
-          </a:prstGeom>
-          <a:gradFill>
-            <a:gsLst>
-              <a:gs pos="84000">
-                <a:srgbClr val="5B9A8B"/>
-              </a:gs>
-              <a:gs pos="62000">
-                <a:srgbClr val="445069"/>
-              </a:gs>
-              <a:gs pos="100000">
-                <a:srgbClr val="F7E987"/>
-              </a:gs>
-            </a:gsLst>
-            <a:lin ang="2700000" scaled="1"/>
-          </a:gradFill>
-          <a:scene3d>
-            <a:camera prst="orthographicFront"/>
-            <a:lightRig rig="threePt" dir="t"/>
-          </a:scene3d>
-          <a:sp3d>
-            <a:bevelT/>
-          </a:sp3d>
-        </p:spPr>
-        <p:style>
-          <a:lnRef idx="2">
-            <a:schemeClr val="accent1">
-              <a:shade val="50000"/>
-            </a:schemeClr>
-          </a:lnRef>
-          <a:fillRef idx="1">
-            <a:schemeClr val="accent1"/>
-          </a:fillRef>
-          <a:effectRef idx="0">
-            <a:schemeClr val="accent1"/>
-          </a:effectRef>
-          <a:fontRef idx="minor">
-            <a:schemeClr val="lt1"/>
-          </a:fontRef>
-        </p:style>
-        <p:txBody>
-          <a:bodyPr rtlCol="0" anchor="ctr"/>
-          <a:lstStyle/>
-          <a:p>
-            <a:pPr algn="ctr"/>
-            <a:endParaRPr lang="es-BO"/>
-          </a:p>
-        </p:txBody>
-      </p:sp>
-      <p:sp>
-        <p:nvSpPr>
-          <p:cNvPr id="17" name="Rectángulo redondeado 16"/>
-          <p:cNvSpPr/>
-          <p:nvPr/>
-        </p:nvSpPr>
-        <p:spPr>
-          <a:xfrm>
-            <a:off x="758756" y="3095566"/>
-            <a:ext cx="3152844" cy="4343911"/>
-          </a:xfrm>
-          <a:prstGeom prst="roundRect">
-            <a:avLst/>
-          </a:prstGeom>
-          <a:gradFill flip="none" rotWithShape="1">
-            <a:gsLst>
-              <a:gs pos="84000">
-                <a:srgbClr val="5B9A8B"/>
-              </a:gs>
-              <a:gs pos="62000">
-                <a:srgbClr val="445069"/>
-              </a:gs>
-              <a:gs pos="100000">
-                <a:srgbClr val="F7E987"/>
-              </a:gs>
-            </a:gsLst>
-            <a:lin ang="2700000" scaled="1"/>
-            <a:tileRect/>
-          </a:gradFill>
-          <a:ln>
-            <a:noFill/>
-          </a:ln>
-          <a:effectLst>
-            <a:outerShdw blurRad="50800" dist="38100" dir="10800000" algn="r" rotWithShape="0">
-              <a:prstClr val="black">
-                <a:alpha val="40000"/>
-              </a:prstClr>
-            </a:outerShdw>
-          </a:effectLst>
-          <a:scene3d>
-            <a:camera prst="orthographicFront">
-              <a:rot lat="0" lon="0" rev="0"/>
-            </a:camera>
-            <a:lightRig rig="contrasting" dir="t">
-              <a:rot lat="0" lon="0" rev="7800000"/>
-            </a:lightRig>
-          </a:scene3d>
-          <a:sp3d>
-            <a:bevelT w="139700" h="139700"/>
-          </a:sp3d>
-        </p:spPr>
-        <p:style>
-          <a:lnRef idx="2">
-            <a:schemeClr val="accent1">
-              <a:shade val="50000"/>
-            </a:schemeClr>
-          </a:lnRef>
-          <a:fillRef idx="1">
-            <a:schemeClr val="accent1"/>
-          </a:fillRef>
-          <a:effectRef idx="0">
-            <a:schemeClr val="accent1"/>
-          </a:effectRef>
-          <a:fontRef idx="minor">
-            <a:schemeClr val="lt1"/>
-          </a:fontRef>
-        </p:style>
-        <p:txBody>
-          <a:bodyPr rtlCol="0" anchor="ctr"/>
-          <a:lstStyle/>
-          <a:p>
-            <a:pPr algn="ctr"/>
-            <a:endParaRPr lang="es-BO"/>
-          </a:p>
-        </p:txBody>
-      </p:sp>
-      <p:sp>
-        <p:nvSpPr>
-          <p:cNvPr id="18" name="Rectángulo redondeado 17"/>
-          <p:cNvSpPr/>
-          <p:nvPr/>
-        </p:nvSpPr>
-        <p:spPr>
-          <a:xfrm>
-            <a:off x="4213221" y="5423353"/>
-            <a:ext cx="5375279" cy="2022474"/>
-          </a:xfrm>
-          <a:prstGeom prst="roundRect">
-            <a:avLst/>
-          </a:prstGeom>
-          <a:gradFill flip="none" rotWithShape="1">
-            <a:gsLst>
-              <a:gs pos="84000">
-                <a:srgbClr val="5B9A8B"/>
-              </a:gs>
-              <a:gs pos="62000">
-                <a:srgbClr val="445069"/>
-              </a:gs>
-              <a:gs pos="100000">
-                <a:srgbClr val="F7E987"/>
-              </a:gs>
-            </a:gsLst>
-            <a:lin ang="2700000" scaled="1"/>
-            <a:tileRect/>
-          </a:gradFill>
-          <a:ln>
-            <a:noFill/>
-          </a:ln>
-          <a:effectLst>
-            <a:outerShdw blurRad="50800" dist="38100" dir="10800000" algn="r" rotWithShape="0">
-              <a:prstClr val="black">
-                <a:alpha val="40000"/>
-              </a:prstClr>
-            </a:outerShdw>
-          </a:effectLst>
-          <a:scene3d>
-            <a:camera prst="orthographicFront">
-              <a:rot lat="0" lon="0" rev="0"/>
-            </a:camera>
-            <a:lightRig rig="contrasting" dir="t">
-              <a:rot lat="0" lon="0" rev="7800000"/>
-            </a:lightRig>
-          </a:scene3d>
-          <a:sp3d>
-            <a:bevelT w="139700" h="139700"/>
-          </a:sp3d>
-        </p:spPr>
-        <p:style>
-          <a:lnRef idx="2">
-            <a:schemeClr val="accent1">
-              <a:shade val="50000"/>
-            </a:schemeClr>
-          </a:lnRef>
-          <a:fillRef idx="1">
-            <a:schemeClr val="accent1"/>
-          </a:fillRef>
-          <a:effectRef idx="0">
-            <a:schemeClr val="accent1"/>
-          </a:effectRef>
-          <a:fontRef idx="minor">
-            <a:schemeClr val="lt1"/>
-          </a:fontRef>
-        </p:style>
-        <p:txBody>
-          <a:bodyPr rtlCol="0" anchor="ctr"/>
-          <a:lstStyle/>
-          <a:p>
-            <a:pPr algn="ctr"/>
-            <a:endParaRPr lang="es-BO"/>
-          </a:p>
-        </p:txBody>
-      </p:sp>
-      <p:sp>
-        <p:nvSpPr>
-          <p:cNvPr id="19" name="Rectángulo redondeado 18"/>
-          <p:cNvSpPr/>
-          <p:nvPr/>
-        </p:nvSpPr>
-        <p:spPr>
-          <a:xfrm>
-            <a:off x="4213221" y="3095566"/>
-            <a:ext cx="5375279" cy="2022474"/>
-          </a:xfrm>
-          <a:prstGeom prst="roundRect">
-            <a:avLst/>
-          </a:prstGeom>
-          <a:gradFill flip="none" rotWithShape="1">
-            <a:gsLst>
-              <a:gs pos="84000">
-                <a:srgbClr val="5B9A8B"/>
-              </a:gs>
-              <a:gs pos="62000">
-                <a:srgbClr val="445069"/>
-              </a:gs>
-              <a:gs pos="100000">
-                <a:srgbClr val="F7E987"/>
-              </a:gs>
-            </a:gsLst>
-            <a:lin ang="2700000" scaled="1"/>
-            <a:tileRect/>
-          </a:gradFill>
-          <a:ln>
-            <a:noFill/>
-          </a:ln>
-          <a:effectLst>
-            <a:outerShdw blurRad="50800" dist="38100" dir="10800000" algn="r" rotWithShape="0">
-              <a:prstClr val="black">
-                <a:alpha val="40000"/>
-              </a:prstClr>
-            </a:outerShdw>
-          </a:effectLst>
-          <a:scene3d>
-            <a:camera prst="orthographicFront">
-              <a:rot lat="0" lon="0" rev="0"/>
-            </a:camera>
-            <a:lightRig rig="contrasting" dir="t">
-              <a:rot lat="0" lon="0" rev="7800000"/>
-            </a:lightRig>
-          </a:scene3d>
-          <a:sp3d>
-            <a:bevelT w="139700" h="139700"/>
-          </a:sp3d>
-        </p:spPr>
-        <p:style>
-          <a:lnRef idx="2">
-            <a:schemeClr val="accent1">
-              <a:shade val="50000"/>
-            </a:schemeClr>
-          </a:lnRef>
-          <a:fillRef idx="1">
-            <a:schemeClr val="accent1"/>
-          </a:fillRef>
-          <a:effectRef idx="0">
-            <a:schemeClr val="accent1"/>
-          </a:effectRef>
-          <a:fontRef idx="minor">
-            <a:schemeClr val="lt1"/>
-          </a:fontRef>
-        </p:style>
-        <p:txBody>
-          <a:bodyPr rtlCol="0" anchor="ctr"/>
-          <a:lstStyle/>
-          <a:p>
-            <a:pPr algn="ctr"/>
-            <a:endParaRPr lang="es-BO"/>
-          </a:p>
-        </p:txBody>
-      </p:sp>
-    </p:spTree>
-    <p:extLst>
-      <p:ext uri="{BB962C8B-B14F-4D97-AF65-F5344CB8AC3E}">
-        <p14:creationId xmlns:p14="http://schemas.microsoft.com/office/powerpoint/2010/main" val="3551309499"/>
-      </p:ext>
-    </p:extLst>
-  </p:cSld>
-  <p:clrMapOvr>
-    <a:masterClrMapping/>
-  </p:clrMapOvr>
-  <p:timing>
-    <p:tnLst>
-      <p:par>
-        <p:cTn id="1" dur="indefinite" restart="never" nodeType="tmRoot"/>
-      </p:par>
-    </p:tnLst>
-  </p:timing>
-</p:sld>
-</file>
-
-<file path=ppt/slides/slide4.xml><?xml version="1.0" encoding="utf-8"?>
-<p:sld xmlns:a="http://schemas.openxmlformats.org/drawingml/2006/main" xmlns:r="http://schemas.openxmlformats.org/officeDocument/2006/relationships" xmlns:p="http://schemas.openxmlformats.org/presentationml/2006/main">
-  <p:cSld>
-    <p:bg>
-      <p:bgPr>
-        <a:gradFill flip="none" rotWithShape="1">
-          <a:gsLst>
             <a:gs pos="60000">
               <a:srgbClr val="04395E"/>
             </a:gs>
@@ -4579,13 +3683,6 @@
   <p:clrMapOvr>
     <a:masterClrMapping/>
   </p:clrMapOvr>
-  <p:timing>
-    <p:tnLst>
-      <p:par>
-        <p:cTn id="1" dur="indefinite" restart="never" nodeType="tmRoot"/>
-      </p:par>
-    </p:tnLst>
-  </p:timing>
 </p:sld>
 </file>
 

</xml_diff>